<commit_message>
changes and add "Send passwrod " functionality 27-11-2018
changes and add "Send passwrod " functionality 27-11-2018
</commit_message>
<xml_diff>
--- a/CordobaAPI/Files/Monthly Report.pptx
+++ b/CordobaAPI/Files/Monthly Report.pptx
@@ -140,7 +140,7 @@
               <a:defRPr/>
             </a:pPr>
             <a:r>
-              <a:t>PARTICIPANTS: (1072)</a:t>
+              <a:t>PARTICIPANTS (2254)</a:t>
             </a:r>
           </a:p>
         </c:rich>
@@ -204,10 +204,10 @@
                 <c:formatCode>General</c:formatCode>
                 <c:ptCount val="2"/>
                 <c:pt idx="0">
-                  <c:v>1029</c:v>
+                  <c:v>2107</c:v>
                 </c:pt>
                 <c:pt idx="1">
-                  <c:v>43</c:v>
+                  <c:v>147</c:v>
                 </c:pt>
               </c:numCache>
             </c:numRef>
@@ -291,7 +291,7 @@
               <a:defRPr/>
             </a:pPr>
             <a:r>
-              <a:t>POINTS (496752)</a:t>
+              <a:t>POINTS (146418)</a:t>
             </a:r>
           </a:p>
         </c:rich>
@@ -355,10 +355,10 @@
                 <c:formatCode>General</c:formatCode>
                 <c:ptCount val="2"/>
                 <c:pt idx="0">
-                  <c:v>448947</c:v>
+                  <c:v>141080</c:v>
                 </c:pt>
                 <c:pt idx="1">
-                  <c:v>47805</c:v>
+                  <c:v>5338</c:v>
                 </c:pt>
               </c:numCache>
             </c:numRef>
@@ -563,73 +563,73 @@
                 <c:formatCode>General</c:formatCode>
                 <c:ptCount val="23"/>
                 <c:pt idx="0">
+                  <c:v>25</c:v>
+                </c:pt>
+                <c:pt idx="1">
+                  <c:v>3</c:v>
+                </c:pt>
+                <c:pt idx="2">
                   <c:v>9</c:v>
                 </c:pt>
-                <c:pt idx="1">
-                  <c:v>5</c:v>
-                </c:pt>
-                <c:pt idx="2">
-                  <c:v>7</c:v>
-                </c:pt>
                 <c:pt idx="3">
-                  <c:v>7</c:v>
+                  <c:v>6</c:v>
                 </c:pt>
                 <c:pt idx="4">
+                  <c:v>14</c:v>
+                </c:pt>
+                <c:pt idx="5">
                   <c:v>15</c:v>
                 </c:pt>
-                <c:pt idx="5">
-                  <c:v>8</c:v>
-                </c:pt>
                 <c:pt idx="6">
-                  <c:v>8</c:v>
+                  <c:v>17</c:v>
                 </c:pt>
                 <c:pt idx="7">
+                  <c:v>37</c:v>
+                </c:pt>
+                <c:pt idx="8">
+                  <c:v>33</c:v>
+                </c:pt>
+                <c:pt idx="9">
+                  <c:v>4</c:v>
+                </c:pt>
+                <c:pt idx="10">
                   <c:v>2</c:v>
                 </c:pt>
-                <c:pt idx="8">
-                  <c:v>1</c:v>
-                </c:pt>
-                <c:pt idx="9">
-                  <c:v>5</c:v>
-                </c:pt>
-                <c:pt idx="10">
-                  <c:v>5</c:v>
-                </c:pt>
                 <c:pt idx="11">
-                  <c:v>6</c:v>
+                  <c:v>4</c:v>
                 </c:pt>
                 <c:pt idx="12">
-                  <c:v>3</c:v>
+                  <c:v>11</c:v>
                 </c:pt>
                 <c:pt idx="13">
-                  <c:v>10</c:v>
+                  <c:v>12</c:v>
                 </c:pt>
                 <c:pt idx="14">
-                  <c:v>4</c:v>
+                  <c:v>22</c:v>
                 </c:pt>
                 <c:pt idx="15">
-                  <c:v>7</c:v>
+                  <c:v>21</c:v>
                 </c:pt>
                 <c:pt idx="16">
-                  <c:v>4</c:v>
+                  <c:v>44</c:v>
                 </c:pt>
                 <c:pt idx="17">
-                  <c:v>11</c:v>
+                  <c:v>23</c:v>
                 </c:pt>
                 <c:pt idx="18">
+                  <c:v>29</c:v>
+                </c:pt>
+                <c:pt idx="19">
+                  <c:v>33</c:v>
+                </c:pt>
+                <c:pt idx="20">
+                  <c:v>25</c:v>
+                </c:pt>
+                <c:pt idx="21">
+                  <c:v>33</c:v>
+                </c:pt>
+                <c:pt idx="22">
                   <c:v>15</c:v>
-                </c:pt>
-                <c:pt idx="19">
-                  <c:v>15</c:v>
-                </c:pt>
-                <c:pt idx="20">
-                  <c:v>7</c:v>
-                </c:pt>
-                <c:pt idx="21">
-                  <c:v>14</c:v>
-                </c:pt>
-                <c:pt idx="22">
-                  <c:v>9</c:v>
                 </c:pt>
               </c:numCache>
             </c:numRef>
@@ -947,7 +947,7 @@
               <a:defRPr/>
             </a:pPr>
             <a:r>
-              <a:t>Order Placed By Type</a:t>
+              <a:t>Points loaded by month</a:t>
             </a:r>
           </a:p>
         </c:rich>
@@ -978,7 +978,7 @@
               <c:strCache>
                 <c:ptCount val="1"/>
                 <c:pt idx="0">
-                  <c:v>OrderCount</c:v>
+                  <c:v>Points</c:v>
                 </c:pt>
               </c:strCache>
             </c:strRef>
@@ -986,83 +986,95 @@
           <c:invertIfNegative/>
           <c:cat>
             <c:strRef>
-              <c:f>Sheet1!$A$2:$A$12</c:f>
+              <c:f>Sheet1!$A$2:$A$14</c:f>
               <c:strCache>
-                <c:ptCount val="11"/>
+                <c:ptCount val="13"/>
                 <c:pt idx="0">
-                  <c:v>Accessories</c:v>
+                  <c:v>January-2017</c:v>
                 </c:pt>
                 <c:pt idx="1">
-                  <c:v>Alcohol</c:v>
+                  <c:v>February-2017</c:v>
                 </c:pt>
                 <c:pt idx="2">
-                  <c:v>Backpacks</c:v>
+                  <c:v>March-2017</c:v>
                 </c:pt>
                 <c:pt idx="3">
-                  <c:v>Decorative Accessories</c:v>
+                  <c:v>April-2017</c:v>
                 </c:pt>
                 <c:pt idx="4">
-                  <c:v>Hampers</c:v>
+                  <c:v>May-2017</c:v>
                 </c:pt>
                 <c:pt idx="5">
-                  <c:v>Home and Garden</c:v>
+                  <c:v>June-2017</c:v>
                 </c:pt>
                 <c:pt idx="6">
-                  <c:v>Outdoor Toys &amp; Games</c:v>
+                  <c:v>July-2017</c:v>
                 </c:pt>
                 <c:pt idx="7">
-                  <c:v>Sports and Leisure</c:v>
+                  <c:v>August-2017</c:v>
                 </c:pt>
                 <c:pt idx="8">
-                  <c:v>Technology</c:v>
+                  <c:v>September-2017</c:v>
                 </c:pt>
                 <c:pt idx="9">
-                  <c:v>Vacuum &amp; Steam Cleaners</c:v>
+                  <c:v>October-2017</c:v>
                 </c:pt>
                 <c:pt idx="10">
-                  <c:v>Vouchers</c:v>
+                  <c:v>November-2017</c:v>
+                </c:pt>
+                <c:pt idx="11">
+                  <c:v>December-2017</c:v>
+                </c:pt>
+                <c:pt idx="12">
+                  <c:v>January-2018</c:v>
                 </c:pt>
               </c:strCache>
             </c:strRef>
           </c:cat>
           <c:val>
             <c:numRef>
-              <c:f>Sheet1!$B$2:$B$12</c:f>
+              <c:f>Sheet1!$B$2:$B$14</c:f>
               <c:numCache>
                 <c:formatCode>General</c:formatCode>
-                <c:ptCount val="11"/>
+                <c:ptCount val="13"/>
                 <c:pt idx="0">
-                  <c:v>2</c:v>
+                  <c:v>5988</c:v>
                 </c:pt>
                 <c:pt idx="1">
-                  <c:v>6</c:v>
+                  <c:v>6183</c:v>
                 </c:pt>
                 <c:pt idx="2">
-                  <c:v>1</c:v>
+                  <c:v>5638</c:v>
                 </c:pt>
                 <c:pt idx="3">
-                  <c:v>1</c:v>
+                  <c:v>31633</c:v>
                 </c:pt>
                 <c:pt idx="4">
-                  <c:v>1</c:v>
+                  <c:v>8810</c:v>
                 </c:pt>
                 <c:pt idx="5">
-                  <c:v>3</c:v>
+                  <c:v>9222</c:v>
                 </c:pt>
                 <c:pt idx="6">
-                  <c:v>1</c:v>
+                  <c:v>12174</c:v>
                 </c:pt>
                 <c:pt idx="7">
-                  <c:v>1</c:v>
+                  <c:v>12150</c:v>
                 </c:pt>
                 <c:pt idx="8">
-                  <c:v>2</c:v>
+                  <c:v>8859</c:v>
                 </c:pt>
                 <c:pt idx="9">
-                  <c:v>1</c:v>
+                  <c:v>10085</c:v>
                 </c:pt>
                 <c:pt idx="10">
-                  <c:v>54</c:v>
+                  <c:v>7280</c:v>
+                </c:pt>
+                <c:pt idx="11">
+                  <c:v>8680</c:v>
+                </c:pt>
+                <c:pt idx="12">
+                  <c:v>4270</c:v>
                 </c:pt>
               </c:numCache>
             </c:numRef>
@@ -1095,51 +1107,57 @@
           </c:marker>
           <c:cat>
             <c:strRef>
-              <c:f>Sheet1!$A$2:$A$12</c:f>
+              <c:f>Sheet1!$A$2:$A$14</c:f>
               <c:strCache>
-                <c:ptCount val="11"/>
+                <c:ptCount val="13"/>
                 <c:pt idx="0">
-                  <c:v>Accessories</c:v>
+                  <c:v>January-2017</c:v>
                 </c:pt>
                 <c:pt idx="1">
-                  <c:v>Alcohol</c:v>
+                  <c:v>February-2017</c:v>
                 </c:pt>
                 <c:pt idx="2">
-                  <c:v>Backpacks</c:v>
+                  <c:v>March-2017</c:v>
                 </c:pt>
                 <c:pt idx="3">
-                  <c:v>Decorative Accessories</c:v>
+                  <c:v>April-2017</c:v>
                 </c:pt>
                 <c:pt idx="4">
-                  <c:v>Hampers</c:v>
+                  <c:v>May-2017</c:v>
                 </c:pt>
                 <c:pt idx="5">
-                  <c:v>Home and Garden</c:v>
+                  <c:v>June-2017</c:v>
                 </c:pt>
                 <c:pt idx="6">
-                  <c:v>Outdoor Toys &amp; Games</c:v>
+                  <c:v>July-2017</c:v>
                 </c:pt>
                 <c:pt idx="7">
-                  <c:v>Sports and Leisure</c:v>
+                  <c:v>August-2017</c:v>
                 </c:pt>
                 <c:pt idx="8">
-                  <c:v>Technology</c:v>
+                  <c:v>September-2017</c:v>
                 </c:pt>
                 <c:pt idx="9">
-                  <c:v>Vacuum &amp; Steam Cleaners</c:v>
+                  <c:v>October-2017</c:v>
                 </c:pt>
                 <c:pt idx="10">
-                  <c:v>Vouchers</c:v>
+                  <c:v>November-2017</c:v>
+                </c:pt>
+                <c:pt idx="11">
+                  <c:v>December-2017</c:v>
+                </c:pt>
+                <c:pt idx="12">
+                  <c:v>January-2018</c:v>
                 </c:pt>
               </c:strCache>
             </c:strRef>
           </c:cat>
           <c:val>
             <c:numRef>
-              <c:f>Sheet1!$C$2:$C$12</c:f>
+              <c:f>Sheet1!$C$2:$C$14</c:f>
               <c:numCache>
                 <c:formatCode>General</c:formatCode>
-                <c:ptCount val="11"/>
+                <c:ptCount val="13"/>
                 <c:pt idx="0">
                   <c:v/>
                 </c:pt>
@@ -1171,6 +1189,12 @@
                   <c:v/>
                 </c:pt>
                 <c:pt idx="10">
+                  <c:v/>
+                </c:pt>
+                <c:pt idx="11">
+                  <c:v/>
+                </c:pt>
+                <c:pt idx="12">
                   <c:v/>
                 </c:pt>
               </c:numCache>
@@ -1247,7 +1271,7 @@
               <a:defRPr/>
             </a:pPr>
             <a:r>
-              <a:t>OrderCount</a:t>
+              <a:t>Points</a:t>
             </a:r>
           </a:p>
         </c:txPr>
@@ -1308,7 +1332,7 @@
               <a:defRPr/>
             </a:pPr>
             <a:r>
-              <a:t>Points loaded by month</a:t>
+              <a:t>Points Reedemed By Month</a:t>
             </a:r>
           </a:p>
         </c:rich>
@@ -1399,43 +1423,43 @@
                 <c:formatCode>General</c:formatCode>
                 <c:ptCount val="13"/>
                 <c:pt idx="0">
-                  <c:v>142884</c:v>
+                  <c:v>2418</c:v>
                 </c:pt>
                 <c:pt idx="1">
-                  <c:v>69708</c:v>
+                  <c:v>1773</c:v>
                 </c:pt>
                 <c:pt idx="2">
-                  <c:v>92893</c:v>
+                  <c:v>1522</c:v>
                 </c:pt>
                 <c:pt idx="3">
-                  <c:v>118831</c:v>
+                  <c:v>5296</c:v>
                 </c:pt>
                 <c:pt idx="4">
-                  <c:v>80647</c:v>
+                  <c:v>3532</c:v>
                 </c:pt>
                 <c:pt idx="5">
-                  <c:v>100723</c:v>
+                  <c:v>2127</c:v>
                 </c:pt>
                 <c:pt idx="6">
-                  <c:v>78528</c:v>
+                  <c:v>3498</c:v>
                 </c:pt>
                 <c:pt idx="7">
-                  <c:v>148342</c:v>
+                  <c:v>6479</c:v>
                 </c:pt>
                 <c:pt idx="8">
-                  <c:v>67970</c:v>
+                  <c:v>2895</c:v>
                 </c:pt>
                 <c:pt idx="9">
-                  <c:v>88461</c:v>
+                  <c:v>3843</c:v>
                 </c:pt>
                 <c:pt idx="10">
-                  <c:v>115811</c:v>
+                  <c:v>11672</c:v>
                 </c:pt>
                 <c:pt idx="11">
-                  <c:v>124112</c:v>
+                  <c:v>9452</c:v>
                 </c:pt>
                 <c:pt idx="12">
-                  <c:v>155452</c:v>
+                  <c:v>2301</c:v>
                 </c:pt>
               </c:numCache>
             </c:numRef>
@@ -1693,7 +1717,7 @@
               <a:defRPr/>
             </a:pPr>
             <a:r>
-              <a:t>Points Reedemed By Month</a:t>
+              <a:t>Order Placed By Type</a:t>
             </a:r>
           </a:p>
         </c:rich>
@@ -1724,7 +1748,7 @@
               <c:strCache>
                 <c:ptCount val="1"/>
                 <c:pt idx="0">
-                  <c:v>Points</c:v>
+                  <c:v>OrderCount</c:v>
                 </c:pt>
               </c:strCache>
             </c:strRef>
@@ -1732,95 +1756,35 @@
           <c:invertIfNegative/>
           <c:cat>
             <c:strRef>
-              <c:f>Sheet1!$A$2:$A$14</c:f>
+              <c:f>Sheet1!$A$2:$A$4</c:f>
               <c:strCache>
-                <c:ptCount val="13"/>
+                <c:ptCount val="3"/>
                 <c:pt idx="0">
-                  <c:v>January-2017</c:v>
+                  <c:v>Fashion</c:v>
                 </c:pt>
                 <c:pt idx="1">
-                  <c:v>February-2017</c:v>
+                  <c:v>Sports and Leisure</c:v>
                 </c:pt>
                 <c:pt idx="2">
-                  <c:v>March-2017</c:v>
-                </c:pt>
-                <c:pt idx="3">
-                  <c:v>April-2017</c:v>
-                </c:pt>
-                <c:pt idx="4">
-                  <c:v>May-2017</c:v>
-                </c:pt>
-                <c:pt idx="5">
-                  <c:v>June-2017</c:v>
-                </c:pt>
-                <c:pt idx="6">
-                  <c:v>July-2017</c:v>
-                </c:pt>
-                <c:pt idx="7">
-                  <c:v>August-2017</c:v>
-                </c:pt>
-                <c:pt idx="8">
-                  <c:v>September-2017</c:v>
-                </c:pt>
-                <c:pt idx="9">
-                  <c:v>October-2017</c:v>
-                </c:pt>
-                <c:pt idx="10">
-                  <c:v>November-2017</c:v>
-                </c:pt>
-                <c:pt idx="11">
-                  <c:v>December-2017</c:v>
-                </c:pt>
-                <c:pt idx="12">
-                  <c:v>January-2018</c:v>
+                  <c:v>Vouchers</c:v>
                 </c:pt>
               </c:strCache>
             </c:strRef>
           </c:cat>
           <c:val>
             <c:numRef>
-              <c:f>Sheet1!$B$2:$B$14</c:f>
+              <c:f>Sheet1!$B$2:$B$4</c:f>
               <c:numCache>
                 <c:formatCode>General</c:formatCode>
-                <c:ptCount val="13"/>
+                <c:ptCount val="3"/>
                 <c:pt idx="0">
-                  <c:v>60186</c:v>
+                  <c:v>1</c:v>
                 </c:pt>
                 <c:pt idx="1">
-                  <c:v>47420</c:v>
+                  <c:v>1</c:v>
                 </c:pt>
                 <c:pt idx="2">
-                  <c:v>18890</c:v>
-                </c:pt>
-                <c:pt idx="3">
-                  <c:v>24392</c:v>
-                </c:pt>
-                <c:pt idx="4">
-                  <c:v>42818</c:v>
-                </c:pt>
-                <c:pt idx="5">
-                  <c:v>46581</c:v>
-                </c:pt>
-                <c:pt idx="6">
-                  <c:v>53423</c:v>
-                </c:pt>
-                <c:pt idx="7">
-                  <c:v>33787</c:v>
-                </c:pt>
-                <c:pt idx="8">
-                  <c:v>39114</c:v>
-                </c:pt>
-                <c:pt idx="9">
-                  <c:v>40677</c:v>
-                </c:pt>
-                <c:pt idx="10">
-                  <c:v>92338</c:v>
-                </c:pt>
-                <c:pt idx="11">
-                  <c:v>60009</c:v>
-                </c:pt>
-                <c:pt idx="12">
-                  <c:v>56947</c:v>
+                  <c:v>11</c:v>
                 </c:pt>
               </c:numCache>
             </c:numRef>
@@ -1853,57 +1817,27 @@
           </c:marker>
           <c:cat>
             <c:strRef>
-              <c:f>Sheet1!$A$2:$A$14</c:f>
+              <c:f>Sheet1!$A$2:$A$4</c:f>
               <c:strCache>
-                <c:ptCount val="13"/>
+                <c:ptCount val="3"/>
                 <c:pt idx="0">
-                  <c:v>January-2017</c:v>
+                  <c:v>Fashion</c:v>
                 </c:pt>
                 <c:pt idx="1">
-                  <c:v>February-2017</c:v>
+                  <c:v>Sports and Leisure</c:v>
                 </c:pt>
                 <c:pt idx="2">
-                  <c:v>March-2017</c:v>
-                </c:pt>
-                <c:pt idx="3">
-                  <c:v>April-2017</c:v>
-                </c:pt>
-                <c:pt idx="4">
-                  <c:v>May-2017</c:v>
-                </c:pt>
-                <c:pt idx="5">
-                  <c:v>June-2017</c:v>
-                </c:pt>
-                <c:pt idx="6">
-                  <c:v>July-2017</c:v>
-                </c:pt>
-                <c:pt idx="7">
-                  <c:v>August-2017</c:v>
-                </c:pt>
-                <c:pt idx="8">
-                  <c:v>September-2017</c:v>
-                </c:pt>
-                <c:pt idx="9">
-                  <c:v>October-2017</c:v>
-                </c:pt>
-                <c:pt idx="10">
-                  <c:v>November-2017</c:v>
-                </c:pt>
-                <c:pt idx="11">
-                  <c:v>December-2017</c:v>
-                </c:pt>
-                <c:pt idx="12">
-                  <c:v>January-2018</c:v>
+                  <c:v>Vouchers</c:v>
                 </c:pt>
               </c:strCache>
             </c:strRef>
           </c:cat>
           <c:val>
             <c:numRef>
-              <c:f>Sheet1!$C$2:$C$14</c:f>
+              <c:f>Sheet1!$C$2:$C$4</c:f>
               <c:numCache>
                 <c:formatCode>General</c:formatCode>
-                <c:ptCount val="13"/>
+                <c:ptCount val="3"/>
                 <c:pt idx="0">
                   <c:v/>
                 </c:pt>
@@ -1911,36 +1845,6 @@
                   <c:v/>
                 </c:pt>
                 <c:pt idx="2">
-                  <c:v/>
-                </c:pt>
-                <c:pt idx="3">
-                  <c:v/>
-                </c:pt>
-                <c:pt idx="4">
-                  <c:v/>
-                </c:pt>
-                <c:pt idx="5">
-                  <c:v/>
-                </c:pt>
-                <c:pt idx="6">
-                  <c:v/>
-                </c:pt>
-                <c:pt idx="7">
-                  <c:v/>
-                </c:pt>
-                <c:pt idx="8">
-                  <c:v/>
-                </c:pt>
-                <c:pt idx="9">
-                  <c:v/>
-                </c:pt>
-                <c:pt idx="10">
-                  <c:v/>
-                </c:pt>
-                <c:pt idx="11">
-                  <c:v/>
-                </c:pt>
-                <c:pt idx="12">
                   <c:v/>
                 </c:pt>
               </c:numCache>
@@ -2017,7 +1921,7 @@
               <a:defRPr/>
             </a:pPr>
             <a:r>
-              <a:t>Points</a:t>
+              <a:t>OrderCount</a:t>
             </a:r>
           </a:p>
         </c:txPr>
@@ -5277,7 +5181,7 @@
           <a:bodyPr/>
           <a:lstStyle/>
           <a:p>
-            <a:fld id="{5D085F3C-61BC-42E9-BD06-83C516DFA9BB}" type="slidenum">
+            <a:fld id="{53BC9310-E56E-4751-A8BA-E9AAA8A79F54}" type="slidenum">
               <a:rPr lang="en-US"/>
               <a:t>1</a:t>
             </a:fld>
@@ -5331,7 +5235,7 @@
           <a:bodyPr/>
           <a:lstStyle/>
           <a:p>
-            <a:fld id="{F6006A9E-B5C6-4369-B719-A1DAE2578890}" type="slidenum">
+            <a:fld id="{BC4CA167-808B-478C-BC04-0EA66CF2604B}" type="slidenum">
               <a:rPr lang="en-US"/>
               <a:t>2</a:t>
             </a:fld>
@@ -5479,7 +5383,7 @@
           <a:bodyPr/>
           <a:lstStyle/>
           <a:p>
-            <a:fld id="{2EC59751-512F-4ECF-AECD-B553EC5FB4FD}" type="slidenum">
+            <a:fld id="{B813067A-991C-477A-A0BA-345279DF2E8B}" type="slidenum">
               <a:rPr lang="en-US"/>
               <a:t>3</a:t>
             </a:fld>
@@ -5564,7 +5468,7 @@
         </p:nvGraphicFramePr>
         <p:xfrm>
           <a:off x="127000" y="2540000"/>
-          <a:ext cx="3810000" cy="3810000"/>
+          <a:ext cx="5080000" cy="3810000"/>
         </p:xfrm>
         <a:graphic>
           <a:graphicData uri="http://schemas.openxmlformats.org/drawingml/2006/chart">
@@ -5580,7 +5484,7 @@
         </p:nvGraphicFramePr>
         <p:xfrm>
           <a:off x="5080000" y="2540000"/>
-          <a:ext cx="3810000" cy="3810000"/>
+          <a:ext cx="5080000" cy="3810000"/>
         </p:xfrm>
         <a:graphic>
           <a:graphicData uri="http://schemas.openxmlformats.org/drawingml/2006/chart">
@@ -5635,7 +5539,7 @@
           <a:bodyPr/>
           <a:lstStyle/>
           <a:p>
-            <a:fld id="{3D14160F-9DD7-41D4-AF86-ABA914D744E7}" type="slidenum">
+            <a:fld id="{9CCA2259-C344-44AB-84CC-EC339806724A}" type="slidenum">
               <a:rPr lang="en-US"/>
               <a:t>4</a:t>
             </a:fld>
@@ -5729,103 +5633,9 @@
           <a:bodyPr/>
           <a:lstStyle/>
           <a:p>
-            <a:fld id="{F9811EC8-499F-454B-B08F-A3E1B7ECA1C3}" type="slidenum">
+            <a:fld id="{16B990C1-DA1A-42BB-A821-E0728998977B}" type="slidenum">
               <a:rPr lang="en-US"/>
               <a:t>5</a:t>
-            </a:fld>
-          </a:p>
-        </p:txBody>
-      </p:sp>
-      <p:pic>
-        <p:nvPicPr>
-          <p:cNvPr id="3" name="New picture"/>
-          <p:cNvPicPr/>
-          <p:nvPr/>
-        </p:nvPicPr>
-        <p:blipFill>
-          <a:blip r:embed="rId3"/>
-          <a:srcRect/>
-          <a:stretch>
-            <a:fillRect/>
-          </a:stretch>
-        </p:blipFill>
-        <p:spPr>
-          <a:xfrm>
-            <a:off x="6350000" y="127000"/>
-            <a:ext cx="2540000" cy="990600"/>
-          </a:xfrm>
-          <a:prstGeom prst="rect"/>
-          <a:ln>
-            <a:noFill/>
-          </a:ln>
-        </p:spPr>
-      </p:pic>
-      <p:graphicFrame>
-        <p:nvGraphicFramePr>
-          <p:cNvPr id="4" name="ChartObject"/>
-          <p:cNvGraphicFramePr/>
-          <p:nvPr/>
-        </p:nvGraphicFramePr>
-        <p:xfrm>
-          <a:off x="127000" y="1270000"/>
-          <a:ext cx="8890000" cy="5080000"/>
-        </p:xfrm>
-        <a:graphic>
-          <a:graphicData uri="http://schemas.openxmlformats.org/drawingml/2006/chart">
-            <c:chart xmlns:c="http://schemas.openxmlformats.org/drawingml/2006/chart" r:id="rId1"/>
-          </a:graphicData>
-        </a:graphic>
-      </p:graphicFrame>
-    </p:spTree>
-  </p:cSld>
-  <p:clrMapOvr>
-    <a:masterClrMapping/>
-  </p:clrMapOvr>
-  <p:timing>
-    <p:tnLst>
-      <p:par>
-        <p:cTn id="1" dur="indefinite" restart="never" nodeType="tmRoot"/>
-      </p:par>
-    </p:tnLst>
-  </p:timing>
-</p:sld>
-</file>
-
-<file path=ppt/slides/slide6.xml><?xml version="1.0" encoding="utf-8"?>
-<p:sld xmlns:a="http://schemas.openxmlformats.org/drawingml/2006/main" xmlns:r="http://schemas.openxmlformats.org/officeDocument/2006/relationships" xmlns:p="http://schemas.openxmlformats.org/presentationml/2006/main">
-  <p:cSld name="">
-    <p:spTree>
-      <p:nvGrpSpPr>
-        <p:cNvPr id="1" name=""/>
-        <p:cNvGrpSpPr/>
-        <p:nvPr/>
-      </p:nvGrpSpPr>
-      <p:grpSpPr>
-        <a:xfrm>
-          <a:off x="0" y="0"/>
-          <a:ext cx="0" cy="0"/>
-          <a:chOff x="0" y="0"/>
-          <a:chExt cx="0" cy="0"/>
-        </a:xfrm>
-      </p:grpSpPr>
-      <p:sp>
-        <p:nvSpPr>
-          <p:cNvPr id="2" name="Slide Number Placeholder 3"/>
-          <p:cNvSpPr>
-            <a:spLocks noGrp="1"/>
-          </p:cNvSpPr>
-          <p:nvPr>
-            <p:ph type="sldNum" sz="quarter" idx="12"/>
-          </p:nvPr>
-        </p:nvSpPr>
-        <p:spPr/>
-        <p:txBody>
-          <a:bodyPr/>
-          <a:lstStyle/>
-          <a:p>
-            <a:fld id="{5EC08FA8-3A30-48D3-8FBD-78EBDBDF1EB8}" type="slidenum">
-              <a:rPr lang="en-US"/>
-              <a:t>6</a:t>
             </a:fld>
           </a:p>
         </p:txBody>
@@ -6007,7 +5817,7 @@
                         <a:rPr sz="1000" dirty="1">
                           <a:latin typeface="Arial Narrow"/>
                         </a:rPr>
-                        <a:t>Simon Wood</a:t>
+                        <a:t>Jaky Pigeon</a:t>
                       </a:r>
                     </a:p>
                   </a:txBody>
@@ -6022,7 +5832,7 @@
                         <a:rPr sz="1000" dirty="1">
                           <a:latin typeface="Arial Narrow"/>
                         </a:rPr>
-                        <a:t>Simon.wood@documentlogic.co.uk </a:t>
+                        <a:t>jack.kilometres88@gmail.com</a:t>
                       </a:r>
                     </a:p>
                   </a:txBody>
@@ -6037,7 +5847,7 @@
                         <a:rPr sz="1000" dirty="1">
                           <a:latin typeface="Arial Narrow"/>
                         </a:rPr>
-                        <a:t>14652</a:t>
+                        <a:t>1743</a:t>
                       </a:r>
                     </a:p>
                   </a:txBody>
@@ -6067,7 +5877,7 @@
                         <a:rPr sz="1000" dirty="1">
                           <a:latin typeface="Arial Narrow"/>
                         </a:rPr>
-                        <a:t>12/12/2017</a:t>
+                        <a:t>8/18/2016</a:t>
                       </a:r>
                     </a:p>
                   </a:txBody>
@@ -6084,7 +5894,7 @@
                         <a:rPr sz="1000" dirty="1">
                           <a:latin typeface="Arial Narrow"/>
                         </a:rPr>
-                        <a:t>Richard Wilkins</a:t>
+                        <a:t>Jason O'Neill</a:t>
                       </a:r>
                     </a:p>
                   </a:txBody>
@@ -6099,7 +5909,7 @@
                         <a:rPr sz="1000" dirty="1">
                           <a:latin typeface="Arial Narrow"/>
                         </a:rPr>
-                        <a:t>rwilkins@sitgroup.co.uk</a:t>
+                        <a:t>jason@thebigcoffee.com</a:t>
                       </a:r>
                     </a:p>
                   </a:txBody>
@@ -6114,7 +5924,7 @@
                         <a:rPr sz="1000" dirty="1">
                           <a:latin typeface="Arial Narrow"/>
                         </a:rPr>
-                        <a:t>5285</a:t>
+                        <a:t>1230</a:t>
                       </a:r>
                     </a:p>
                   </a:txBody>
@@ -6144,7 +5954,7 @@
                         <a:rPr sz="1000" dirty="1">
                           <a:latin typeface="Arial Narrow"/>
                         </a:rPr>
-                        <a:t>6/2/2016</a:t>
+                        <a:t>3/29/2017</a:t>
                       </a:r>
                     </a:p>
                   </a:txBody>
@@ -6161,7 +5971,7 @@
                         <a:rPr sz="1000" dirty="1">
                           <a:latin typeface="Arial Narrow"/>
                         </a:rPr>
-                        <a:t>Demot Liddy</a:t>
+                        <a:t>Chris Jakeways</a:t>
                       </a:r>
                     </a:p>
                   </a:txBody>
@@ -6176,7 +5986,7 @@
                         <a:rPr sz="1000" dirty="1">
                           <a:latin typeface="Arial Narrow"/>
                         </a:rPr>
-                        <a:t>sales@b4btelecoms.com</a:t>
+                        <a:t>chris@vansalesuk.co.uk</a:t>
                       </a:r>
                     </a:p>
                   </a:txBody>
@@ -6191,7 +6001,7 @@
                         <a:rPr sz="1000" dirty="1">
                           <a:latin typeface="Arial Narrow"/>
                         </a:rPr>
-                        <a:t>3395</a:t>
+                        <a:t>1189</a:t>
                       </a:r>
                     </a:p>
                   </a:txBody>
@@ -6221,7 +6031,7 @@
                         <a:rPr sz="1000" dirty="1">
                           <a:latin typeface="Arial Narrow"/>
                         </a:rPr>
-                        <a:t>2/21/2017</a:t>
+                        <a:t>1/25/2017</a:t>
                       </a:r>
                     </a:p>
                   </a:txBody>
@@ -6238,7 +6048,7 @@
                         <a:rPr sz="1000" dirty="1">
                           <a:latin typeface="Arial Narrow"/>
                         </a:rPr>
-                        <a:t>Kevin Bowden</a:t>
+                        <a:t>Tony Lacey</a:t>
                       </a:r>
                     </a:p>
                   </a:txBody>
@@ -6253,7 +6063,7 @@
                         <a:rPr sz="1000" dirty="1">
                           <a:latin typeface="Arial Narrow"/>
                         </a:rPr>
-                        <a:t>kevin@bowdendigitec.co.uk</a:t>
+                        <a:t>tonylacey2002@gmail.com</a:t>
                       </a:r>
                     </a:p>
                   </a:txBody>
@@ -6268,7 +6078,7 @@
                         <a:rPr sz="1000" dirty="1">
                           <a:latin typeface="Arial Narrow"/>
                         </a:rPr>
-                        <a:t>2595</a:t>
+                        <a:t>1090</a:t>
                       </a:r>
                     </a:p>
                   </a:txBody>
@@ -6298,7 +6108,7 @@
                         <a:rPr sz="1000" dirty="1">
                           <a:latin typeface="Arial Narrow"/>
                         </a:rPr>
-                        <a:t>12/12/2017</a:t>
+                        <a:t>4/5/2016</a:t>
                       </a:r>
                     </a:p>
                   </a:txBody>
@@ -6315,7 +6125,7 @@
                         <a:rPr sz="1000" dirty="1">
                           <a:latin typeface="Arial Narrow"/>
                         </a:rPr>
-                        <a:t>Brett Humphreys</a:t>
+                        <a:t>Adrian Teasdale</a:t>
                       </a:r>
                     </a:p>
                   </a:txBody>
@@ -6330,7 +6140,7 @@
                         <a:rPr sz="1000" dirty="1">
                           <a:latin typeface="Arial Narrow"/>
                         </a:rPr>
-                        <a:t>Brett.Humphreys@mpsplc.co.uk</a:t>
+                        <a:t>adrian@tradewindscreens.co.uk</a:t>
                       </a:r>
                     </a:p>
                   </a:txBody>
@@ -6345,7 +6155,7 @@
                         <a:rPr sz="1000" dirty="1">
                           <a:latin typeface="Arial Narrow"/>
                         </a:rPr>
-                        <a:t>2140</a:t>
+                        <a:t>900</a:t>
                       </a:r>
                     </a:p>
                   </a:txBody>
@@ -6375,7 +6185,7 @@
                         <a:rPr sz="1000" dirty="1">
                           <a:latin typeface="Arial Narrow"/>
                         </a:rPr>
-                        <a:t>6/15/2017</a:t>
+                        <a:t>2/25/2013</a:t>
                       </a:r>
                     </a:p>
                   </a:txBody>
@@ -6392,7 +6202,7 @@
                         <a:rPr sz="1000" dirty="1">
                           <a:latin typeface="Arial Narrow"/>
                         </a:rPr>
-                        <a:t>Andrew Thompson</a:t>
+                        <a:t>Roy Ingleton</a:t>
                       </a:r>
                     </a:p>
                   </a:txBody>
@@ -6407,7 +6217,7 @@
                         <a:rPr sz="1000" dirty="1">
                           <a:latin typeface="Arial Narrow"/>
                         </a:rPr>
-                        <a:t>andrewthompson@copyprintuk.com</a:t>
+                        <a:t>ringleton@smguk.co.uk</a:t>
                       </a:r>
                     </a:p>
                   </a:txBody>
@@ -6422,7 +6232,7 @@
                         <a:rPr sz="1000" dirty="1">
                           <a:latin typeface="Arial Narrow"/>
                         </a:rPr>
-                        <a:t>2009</a:t>
+                        <a:t>790</a:t>
                       </a:r>
                     </a:p>
                   </a:txBody>
@@ -6452,7 +6262,7 @@
                         <a:rPr sz="1000" dirty="1">
                           <a:latin typeface="Arial Narrow"/>
                         </a:rPr>
-                        <a:t>3/17/2017</a:t>
+                        <a:t>11/10/2014</a:t>
                       </a:r>
                     </a:p>
                   </a:txBody>
@@ -6469,7 +6279,7 @@
                         <a:rPr sz="1000" dirty="1">
                           <a:latin typeface="Arial Narrow"/>
                         </a:rPr>
-                        <a:t>John Burns</a:t>
+                        <a:t>Laine Watts</a:t>
                       </a:r>
                     </a:p>
                   </a:txBody>
@@ -6484,7 +6294,7 @@
                         <a:rPr sz="1000" dirty="1">
                           <a:latin typeface="Arial Narrow"/>
                         </a:rPr>
-                        <a:t>john@diamond-group.net</a:t>
+                        <a:t>lwatts@smguk.co.uk</a:t>
                       </a:r>
                     </a:p>
                   </a:txBody>
@@ -6499,7 +6309,7 @@
                         <a:rPr sz="1000" dirty="1">
                           <a:latin typeface="Arial Narrow"/>
                         </a:rPr>
-                        <a:t>1832</a:t>
+                        <a:t>760</a:t>
                       </a:r>
                     </a:p>
                   </a:txBody>
@@ -6529,7 +6339,7 @@
                         <a:rPr sz="1000" dirty="1">
                           <a:latin typeface="Arial Narrow"/>
                         </a:rPr>
-                        <a:t>10/6/2016</a:t>
+                        <a:t>1/22/2013</a:t>
                       </a:r>
                     </a:p>
                   </a:txBody>
@@ -6546,7 +6356,7 @@
                         <a:rPr sz="1000" dirty="1">
                           <a:latin typeface="Arial Narrow"/>
                         </a:rPr>
-                        <a:t>Brian Kidd</a:t>
+                        <a:t>Vans Direct</a:t>
                       </a:r>
                     </a:p>
                   </a:txBody>
@@ -6561,7 +6371,7 @@
                         <a:rPr sz="1000" dirty="1">
                           <a:latin typeface="Arial Narrow"/>
                         </a:rPr>
-                        <a:t>bjk@1office.co.uk</a:t>
+                        <a:t>Customer.Care@vansdirect.co.uk</a:t>
                       </a:r>
                     </a:p>
                   </a:txBody>
@@ -6576,7 +6386,7 @@
                         <a:rPr sz="1000" dirty="1">
                           <a:latin typeface="Arial Narrow"/>
                         </a:rPr>
-                        <a:t>1795</a:t>
+                        <a:t>699</a:t>
                       </a:r>
                     </a:p>
                   </a:txBody>
@@ -6606,7 +6416,7 @@
                         <a:rPr sz="1000" dirty="1">
                           <a:latin typeface="Arial Narrow"/>
                         </a:rPr>
-                        <a:t>4/4/2016</a:t>
+                        <a:t>8/23/2017</a:t>
                       </a:r>
                     </a:p>
                   </a:txBody>
@@ -6623,7 +6433,7 @@
                         <a:rPr sz="1000" dirty="1">
                           <a:latin typeface="Arial Narrow"/>
                         </a:rPr>
-                        <a:t>Stephen Preston</a:t>
+                        <a:t>John Mullen</a:t>
                       </a:r>
                     </a:p>
                   </a:txBody>
@@ -6638,7 +6448,7 @@
                         <a:rPr sz="1000" dirty="1">
                           <a:latin typeface="Arial Narrow"/>
                         </a:rPr>
-                        <a:t>stephen@mastercopy.co.uk</a:t>
+                        <a:t>edencommercialsltd@hotmail.com</a:t>
                       </a:r>
                     </a:p>
                   </a:txBody>
@@ -6653,7 +6463,7 @@
                         <a:rPr sz="1000" dirty="1">
                           <a:latin typeface="Arial Narrow"/>
                         </a:rPr>
-                        <a:t>1453</a:t>
+                        <a:t>632</a:t>
                       </a:r>
                     </a:p>
                   </a:txBody>
@@ -6683,7 +6493,7 @@
                         <a:rPr sz="1000" dirty="1">
                           <a:latin typeface="Arial Narrow"/>
                         </a:rPr>
-                        <a:t>11/2/2015</a:t>
+                        <a:t>1/3/2017</a:t>
                       </a:r>
                     </a:p>
                   </a:txBody>
@@ -6700,7 +6510,7 @@
                         <a:rPr sz="1000" dirty="1">
                           <a:latin typeface="Arial Narrow"/>
                         </a:rPr>
-                        <a:t>Luke Rawlins</a:t>
+                        <a:t>Mike Howlin</a:t>
                       </a:r>
                     </a:p>
                   </a:txBody>
@@ -6715,7 +6525,7 @@
                         <a:rPr sz="1000" dirty="1">
                           <a:latin typeface="Arial Narrow"/>
                         </a:rPr>
-                        <a:t>luke.rawlins@ecotechos.co.uk</a:t>
+                        <a:t>mikehowlinmotors@btconnect.com</a:t>
                       </a:r>
                     </a:p>
                   </a:txBody>
@@ -6730,7 +6540,7 @@
                         <a:rPr sz="1000" dirty="1">
                           <a:latin typeface="Arial Narrow"/>
                         </a:rPr>
-                        <a:t>1442</a:t>
+                        <a:t>530</a:t>
                       </a:r>
                     </a:p>
                   </a:txBody>
@@ -6760,7 +6570,7 @@
                         <a:rPr sz="1000" dirty="1">
                           <a:latin typeface="Arial Narrow"/>
                         </a:rPr>
-                        <a:t>8/25/2016</a:t>
+                        <a:t>1/22/2013</a:t>
                       </a:r>
                     </a:p>
                   </a:txBody>
@@ -6768,6 +6578,100 @@
                 </a:tc>
               </a:tr>
             </a:tbl>
+          </a:graphicData>
+        </a:graphic>
+      </p:graphicFrame>
+    </p:spTree>
+  </p:cSld>
+  <p:clrMapOvr>
+    <a:masterClrMapping/>
+  </p:clrMapOvr>
+  <p:timing>
+    <p:tnLst>
+      <p:par>
+        <p:cTn id="1" dur="indefinite" restart="never" nodeType="tmRoot"/>
+      </p:par>
+    </p:tnLst>
+  </p:timing>
+</p:sld>
+</file>
+
+<file path=ppt/slides/slide6.xml><?xml version="1.0" encoding="utf-8"?>
+<p:sld xmlns:a="http://schemas.openxmlformats.org/drawingml/2006/main" xmlns:r="http://schemas.openxmlformats.org/officeDocument/2006/relationships" xmlns:p="http://schemas.openxmlformats.org/presentationml/2006/main">
+  <p:cSld name="">
+    <p:spTree>
+      <p:nvGrpSpPr>
+        <p:cNvPr id="1" name=""/>
+        <p:cNvGrpSpPr/>
+        <p:nvPr/>
+      </p:nvGrpSpPr>
+      <p:grpSpPr>
+        <a:xfrm>
+          <a:off x="0" y="0"/>
+          <a:ext cx="0" cy="0"/>
+          <a:chOff x="0" y="0"/>
+          <a:chExt cx="0" cy="0"/>
+        </a:xfrm>
+      </p:grpSpPr>
+      <p:sp>
+        <p:nvSpPr>
+          <p:cNvPr id="2" name="Slide Number Placeholder 3"/>
+          <p:cNvSpPr>
+            <a:spLocks noGrp="1"/>
+          </p:cNvSpPr>
+          <p:nvPr>
+            <p:ph type="sldNum" sz="quarter" idx="12"/>
+          </p:nvPr>
+        </p:nvSpPr>
+        <p:spPr/>
+        <p:txBody>
+          <a:bodyPr/>
+          <a:lstStyle/>
+          <a:p>
+            <a:fld id="{43F5F5F9-DB45-4525-93F8-1D9ED88C92A6}" type="slidenum">
+              <a:rPr lang="en-US"/>
+              <a:t>6</a:t>
+            </a:fld>
+          </a:p>
+        </p:txBody>
+      </p:sp>
+      <p:pic>
+        <p:nvPicPr>
+          <p:cNvPr id="3" name="New picture"/>
+          <p:cNvPicPr/>
+          <p:nvPr/>
+        </p:nvPicPr>
+        <p:blipFill>
+          <a:blip r:embed="rId3"/>
+          <a:srcRect/>
+          <a:stretch>
+            <a:fillRect/>
+          </a:stretch>
+        </p:blipFill>
+        <p:spPr>
+          <a:xfrm>
+            <a:off x="6350000" y="127000"/>
+            <a:ext cx="2540000" cy="990600"/>
+          </a:xfrm>
+          <a:prstGeom prst="rect"/>
+          <a:ln>
+            <a:noFill/>
+          </a:ln>
+        </p:spPr>
+      </p:pic>
+      <p:graphicFrame>
+        <p:nvGraphicFramePr>
+          <p:cNvPr id="4" name="ChartObject"/>
+          <p:cNvGraphicFramePr/>
+          <p:nvPr/>
+        </p:nvGraphicFramePr>
+        <p:xfrm>
+          <a:off x="127000" y="1524000"/>
+          <a:ext cx="8890000" cy="5080000"/>
+        </p:xfrm>
+        <a:graphic>
+          <a:graphicData uri="http://schemas.openxmlformats.org/drawingml/2006/chart">
+            <c:chart xmlns:c="http://schemas.openxmlformats.org/drawingml/2006/chart" r:id="rId1"/>
           </a:graphicData>
         </a:graphic>
       </p:graphicFrame>
@@ -6818,7 +6722,7 @@
           <a:bodyPr/>
           <a:lstStyle/>
           <a:p>
-            <a:fld id="{5A22B7CA-1E58-43E7-A95D-982EE2068EC8}" type="slidenum">
+            <a:fld id="{60F126B5-C783-4E02-AA68-0175B74C2858}" type="slidenum">
               <a:rPr lang="en-US"/>
               <a:t>7</a:t>
             </a:fld>
@@ -6912,7 +6816,7 @@
           <a:bodyPr/>
           <a:lstStyle/>
           <a:p>
-            <a:fld id="{3DB4315F-D968-4C40-A013-A02515722F75}" type="slidenum">
+            <a:fld id="{4C8B8760-6992-4563-B6FE-9452F6259C11}" type="slidenum">
               <a:rPr lang="en-US"/>
               <a:t>8</a:t>
             </a:fld>
@@ -6950,7 +6854,7 @@
           <p:nvPr/>
         </p:nvGraphicFramePr>
         <p:xfrm>
-          <a:off x="127000" y="1524000"/>
+          <a:off x="127000" y="1270000"/>
           <a:ext cx="8890000" cy="5080000"/>
         </p:xfrm>
         <a:graphic>

</xml_diff>

<commit_message>
Email template for creating new password from Admin
Email template for creating new password from Admin
</commit_message>
<xml_diff>
--- a/CordobaAPI/Files/Monthly Report.pptx
+++ b/CordobaAPI/Files/Monthly Report.pptx
@@ -5181,7 +5181,7 @@
           <a:bodyPr/>
           <a:lstStyle/>
           <a:p>
-            <a:fld id="{53BC9310-E56E-4751-A8BA-E9AAA8A79F54}" type="slidenum">
+            <a:fld id="{30BD2947-AE7C-411C-9261-401CD366ABAB}" type="slidenum">
               <a:rPr lang="en-US"/>
               <a:t>1</a:t>
             </a:fld>
@@ -5235,7 +5235,7 @@
           <a:bodyPr/>
           <a:lstStyle/>
           <a:p>
-            <a:fld id="{BC4CA167-808B-478C-BC04-0EA66CF2604B}" type="slidenum">
+            <a:fld id="{24CBFB93-7B5C-402F-AE3D-EC6DBD1EDE0C}" type="slidenum">
               <a:rPr lang="en-US"/>
               <a:t>2</a:t>
             </a:fld>
@@ -5383,7 +5383,7 @@
           <a:bodyPr/>
           <a:lstStyle/>
           <a:p>
-            <a:fld id="{B813067A-991C-477A-A0BA-345279DF2E8B}" type="slidenum">
+            <a:fld id="{B814E145-5C86-439F-B7E8-012171CC409F}" type="slidenum">
               <a:rPr lang="en-US"/>
               <a:t>3</a:t>
             </a:fld>
@@ -5468,7 +5468,7 @@
         </p:nvGraphicFramePr>
         <p:xfrm>
           <a:off x="127000" y="2540000"/>
-          <a:ext cx="5080000" cy="3810000"/>
+          <a:ext cx="4064000" cy="3810000"/>
         </p:xfrm>
         <a:graphic>
           <a:graphicData uri="http://schemas.openxmlformats.org/drawingml/2006/chart">
@@ -5484,7 +5484,7 @@
         </p:nvGraphicFramePr>
         <p:xfrm>
           <a:off x="5080000" y="2540000"/>
-          <a:ext cx="5080000" cy="3810000"/>
+          <a:ext cx="4064000" cy="3810000"/>
         </p:xfrm>
         <a:graphic>
           <a:graphicData uri="http://schemas.openxmlformats.org/drawingml/2006/chart">
@@ -5539,7 +5539,7 @@
           <a:bodyPr/>
           <a:lstStyle/>
           <a:p>
-            <a:fld id="{9CCA2259-C344-44AB-84CC-EC339806724A}" type="slidenum">
+            <a:fld id="{759A7D94-419C-4FBF-9D09-F58486DF1484}" type="slidenum">
               <a:rPr lang="en-US"/>
               <a:t>4</a:t>
             </a:fld>
@@ -5633,7 +5633,7 @@
           <a:bodyPr/>
           <a:lstStyle/>
           <a:p>
-            <a:fld id="{16B990C1-DA1A-42BB-A821-E0728998977B}" type="slidenum">
+            <a:fld id="{997189A4-8DCF-40A8-AEBF-84BA10FF5BA8}" type="slidenum">
               <a:rPr lang="en-US"/>
               <a:t>5</a:t>
             </a:fld>
@@ -6628,7 +6628,7 @@
           <a:bodyPr/>
           <a:lstStyle/>
           <a:p>
-            <a:fld id="{43F5F5F9-DB45-4525-93F8-1D9ED88C92A6}" type="slidenum">
+            <a:fld id="{D8DC8DCF-B31C-48A2-B793-1C8539F2459A}" type="slidenum">
               <a:rPr lang="en-US"/>
               <a:t>6</a:t>
             </a:fld>
@@ -6722,7 +6722,7 @@
           <a:bodyPr/>
           <a:lstStyle/>
           <a:p>
-            <a:fld id="{60F126B5-C783-4E02-AA68-0175B74C2858}" type="slidenum">
+            <a:fld id="{FD580468-9D50-43F1-A8EC-AB98A966F202}" type="slidenum">
               <a:rPr lang="en-US"/>
               <a:t>7</a:t>
             </a:fld>
@@ -6816,7 +6816,7 @@
           <a:bodyPr/>
           <a:lstStyle/>
           <a:p>
-            <a:fld id="{4C8B8760-6992-4563-B6FE-9452F6259C11}" type="slidenum">
+            <a:fld id="{D7D3A585-5B04-49C5-94C0-5F934B18EE6C}" type="slidenum">
               <a:rPr lang="en-US"/>
               <a:t>8</a:t>
             </a:fld>

</xml_diff>